<commit_message>
Final presentations of Hackathon project
</commit_message>
<xml_diff>
--- a/PPT_dla_uczestników_LC16.pptx
+++ b/PPT_dla_uczestników_LC16.pptx
@@ -16,7 +16,6 @@
     <p:sldId id="260" r:id="rId9"/>
     <p:sldId id="261" r:id="rId10"/>
     <p:sldId id="262" r:id="rId11"/>
-    <p:sldId id="263" r:id="rId12"/>
   </p:sldIdLst>
   <p:sldSz cx="9144000" cy="6858000"/>
   <p:notesSz cx="6858000" cy="9144000"/>
@@ -192,7 +191,7 @@
           <a:bodyPr lIns="0" rIns="0" tIns="0" bIns="0" anchor="b"/>
           <a:p>
             <a:pPr algn="r"/>
-            <a:fld id="{17B36971-8253-4BFE-940E-01285392A937}" type="slidenum">
+            <a:fld id="{25C05A0D-4C6E-490A-8ACE-3738EEB182A1}" type="slidenum">
               <a:rPr lang="en-US" sz="1400">
                 <a:latin typeface="Times New Roman"/>
               </a:rPr>
@@ -227,7 +226,7 @@
       </p:grpSpPr>
       <p:sp>
         <p:nvSpPr>
-          <p:cNvPr id="112" name="PlaceHolder 1"/>
+          <p:cNvPr id="114" name="PlaceHolder 1"/>
           <p:cNvSpPr>
             <a:spLocks noGrp="1"/>
           </p:cNvSpPr>
@@ -253,7 +252,7 @@
       </p:sp>
       <p:sp>
         <p:nvSpPr>
-          <p:cNvPr id="113" name="CustomShape 2"/>
+          <p:cNvPr id="115" name="CustomShape 2"/>
           <p:cNvSpPr/>
           <p:nvPr/>
         </p:nvSpPr>
@@ -278,7 +277,7 @@
                 <a:spcPct val="100000"/>
               </a:lnSpc>
             </a:pPr>
-            <a:fld id="{FA7949C0-1936-486E-BB57-0A268271AD25}" type="slidenum">
+            <a:fld id="{A0BEF033-8D9C-4EEE-8FA4-8D598A6F800A}" type="slidenum">
               <a:rPr lang="en-US" sz="1200">
                 <a:solidFill>
                   <a:srgbClr val="000000"/>
@@ -316,7 +315,7 @@
       </p:grpSpPr>
       <p:sp>
         <p:nvSpPr>
-          <p:cNvPr id="114" name="PlaceHolder 1"/>
+          <p:cNvPr id="116" name="PlaceHolder 1"/>
           <p:cNvSpPr>
             <a:spLocks noGrp="1"/>
           </p:cNvSpPr>
@@ -354,7 +353,7 @@
       </p:sp>
       <p:sp>
         <p:nvSpPr>
-          <p:cNvPr id="115" name="CustomShape 2"/>
+          <p:cNvPr id="117" name="CustomShape 2"/>
           <p:cNvSpPr/>
           <p:nvPr/>
         </p:nvSpPr>
@@ -379,7 +378,7 @@
                 <a:spcPct val="100000"/>
               </a:lnSpc>
             </a:pPr>
-            <a:fld id="{0A606581-34F9-4516-9A03-D1D4A09D7B7C}" type="slidenum">
+            <a:fld id="{657DB16D-8D44-4F5D-A4D4-9C9F3F4A0F80}" type="slidenum">
               <a:rPr lang="en-US" sz="1200">
                 <a:solidFill>
                   <a:srgbClr val="000000"/>
@@ -417,7 +416,7 @@
       </p:grpSpPr>
       <p:sp>
         <p:nvSpPr>
-          <p:cNvPr id="116" name="PlaceHolder 1"/>
+          <p:cNvPr id="118" name="PlaceHolder 1"/>
           <p:cNvSpPr>
             <a:spLocks noGrp="1"/>
           </p:cNvSpPr>
@@ -455,7 +454,7 @@
       </p:sp>
       <p:sp>
         <p:nvSpPr>
-          <p:cNvPr id="117" name="CustomShape 2"/>
+          <p:cNvPr id="119" name="CustomShape 2"/>
           <p:cNvSpPr/>
           <p:nvPr/>
         </p:nvSpPr>
@@ -480,7 +479,7 @@
                 <a:spcPct val="100000"/>
               </a:lnSpc>
             </a:pPr>
-            <a:fld id="{EEF6BD42-7C49-4961-B9A1-0712ACCB2563}" type="slidenum">
+            <a:fld id="{2BA178DD-F7E4-4AD2-A1C8-FDDB645B9688}" type="slidenum">
               <a:rPr lang="en-US" sz="1200">
                 <a:solidFill>
                   <a:srgbClr val="000000"/>
@@ -518,7 +517,7 @@
       </p:grpSpPr>
       <p:sp>
         <p:nvSpPr>
-          <p:cNvPr id="118" name="PlaceHolder 1"/>
+          <p:cNvPr id="120" name="PlaceHolder 1"/>
           <p:cNvSpPr>
             <a:spLocks noGrp="1"/>
           </p:cNvSpPr>
@@ -556,7 +555,7 @@
       </p:sp>
       <p:sp>
         <p:nvSpPr>
-          <p:cNvPr id="119" name="CustomShape 2"/>
+          <p:cNvPr id="121" name="CustomShape 2"/>
           <p:cNvSpPr/>
           <p:nvPr/>
         </p:nvSpPr>
@@ -581,7 +580,108 @@
                 <a:spcPct val="100000"/>
               </a:lnSpc>
             </a:pPr>
-            <a:fld id="{EF572FAF-2AAA-4C36-A577-83DC1AFB2C69}" type="slidenum">
+            <a:fld id="{4F79E36D-C614-43DD-A98E-523962B5D010}" type="slidenum">
+              <a:rPr lang="en-US" sz="1200">
+                <a:solidFill>
+                  <a:srgbClr val="000000"/>
+                </a:solidFill>
+                <a:latin typeface="+mn-lt"/>
+                <a:ea typeface="+mn-ea"/>
+              </a:rPr>
+              <a:t>&lt;number&gt;</a:t>
+            </a:fld>
+            <a:endParaRPr/>
+          </a:p>
+        </p:txBody>
+      </p:sp>
+    </p:spTree>
+  </p:cSld>
+</p:notes>
+</file>
+
+<file path=ppt/notesSlides/notesSlide5.xml><?xml version="1.0" encoding="utf-8"?>
+<p:notes xmlns:a="http://schemas.openxmlformats.org/drawingml/2006/main" xmlns:p="http://schemas.openxmlformats.org/presentationml/2006/main" xmlns:r="http://schemas.openxmlformats.org/officeDocument/2006/relationships">
+  <p:cSld>
+    <p:spTree>
+      <p:nvGrpSpPr>
+        <p:cNvPr id="1" name=""/>
+        <p:cNvGrpSpPr/>
+        <p:nvPr/>
+      </p:nvGrpSpPr>
+      <p:grpSpPr>
+        <a:xfrm>
+          <a:off x="0" y="0"/>
+          <a:ext cx="0" cy="0"/>
+          <a:chOff x="0" y="0"/>
+          <a:chExt cx="0" cy="0"/>
+        </a:xfrm>
+      </p:grpSpPr>
+      <p:sp>
+        <p:nvSpPr>
+          <p:cNvPr id="122" name="PlaceHolder 1"/>
+          <p:cNvSpPr>
+            <a:spLocks noGrp="1"/>
+          </p:cNvSpPr>
+          <p:nvPr>
+            <p:ph type="body"/>
+          </p:nvPr>
+        </p:nvSpPr>
+        <p:spPr>
+          <a:xfrm>
+            <a:off x="685800" y="4400640"/>
+            <a:ext cx="5485680" cy="3599640"/>
+          </a:xfrm>
+          <a:prstGeom prst="rect">
+            <a:avLst/>
+          </a:prstGeom>
+        </p:spPr>
+        <p:txBody>
+          <a:bodyPr lIns="0" rIns="0" tIns="0" bIns="0"/>
+          <a:p>
+            <a:r>
+              <a:rPr lang="en-US" sz="2000">
+                <a:latin typeface="Arial"/>
+              </a:rPr>
+              <a:t>Na tym slajdzie podzielcie się z nami jakie problemy napotkaliście podczas tworzenia Waszej aplikacji, a może obeszło się bez nich? </a:t>
+            </a:r>
+            <a:r>
+              <a:rPr lang="en-US" sz="2000">
+                <a:latin typeface="Wingdings"/>
+              </a:rPr>
+              <a:t> </a:t>
+            </a:r>
+            <a:endParaRPr/>
+          </a:p>
+        </p:txBody>
+      </p:sp>
+      <p:sp>
+        <p:nvSpPr>
+          <p:cNvPr id="123" name="CustomShape 2"/>
+          <p:cNvSpPr/>
+          <p:nvPr/>
+        </p:nvSpPr>
+        <p:spPr>
+          <a:xfrm>
+            <a:off x="3884760" y="8685360"/>
+            <a:ext cx="2971080" cy="457920"/>
+          </a:xfrm>
+          <a:prstGeom prst="rect">
+            <a:avLst/>
+          </a:prstGeom>
+          <a:noFill/>
+          <a:ln>
+            <a:noFill/>
+          </a:ln>
+        </p:spPr>
+        <p:txBody>
+          <a:bodyPr lIns="90000" rIns="90000" tIns="45000" bIns="45000" anchor="b"/>
+          <a:p>
+            <a:pPr algn="r">
+              <a:lnSpc>
+                <a:spcPct val="100000"/>
+              </a:lnSpc>
+            </a:pPr>
+            <a:fld id="{8BB33AD9-829E-4161-9CFE-E92748DCDB1D}" type="slidenum">
               <a:rPr lang="en-US" sz="1200">
                 <a:solidFill>
                   <a:srgbClr val="000000"/>
@@ -619,7 +719,7 @@
       </p:grpSpPr>
       <p:sp>
         <p:nvSpPr>
-          <p:cNvPr id="120" name="PlaceHolder 1"/>
+          <p:cNvPr id="124" name="PlaceHolder 1"/>
           <p:cNvSpPr>
             <a:spLocks noGrp="1"/>
           </p:cNvSpPr>
@@ -643,7 +743,7 @@
               <a:rPr lang="en-US" sz="2000">
                 <a:latin typeface="Arial"/>
               </a:rPr>
-              <a:t>Na tym slajdzie podzielcie się z nami jakie problemy napotkaliście podczas tworzenia Waszej aplikacji, a może obeszło się bez nich? </a:t>
+              <a:t>Jesteśmy bardzo ciekawi z czego jesteście najbardziej dumni i co przyniosło Wam najwięcej satysfakcji – w tym miejscu możecie się tym podzielić </a:t>
             </a:r>
             <a:r>
               <a:rPr lang="en-US" sz="2000">
@@ -657,7 +757,7 @@
       </p:sp>
       <p:sp>
         <p:nvSpPr>
-          <p:cNvPr id="121" name="CustomShape 2"/>
+          <p:cNvPr id="125" name="CustomShape 2"/>
           <p:cNvSpPr/>
           <p:nvPr/>
         </p:nvSpPr>
@@ -682,7 +782,7 @@
                 <a:spcPct val="100000"/>
               </a:lnSpc>
             </a:pPr>
-            <a:fld id="{9F9112B2-C11B-449C-8130-14612458F22A}" type="slidenum">
+            <a:fld id="{7A58B11A-3274-4CB0-B1D6-F1FDD7FF8682}" type="slidenum">
               <a:rPr lang="en-US" sz="1200">
                 <a:solidFill>
                   <a:srgbClr val="000000"/>
@@ -720,7 +820,7 @@
       </p:grpSpPr>
       <p:sp>
         <p:nvSpPr>
-          <p:cNvPr id="122" name="PlaceHolder 1"/>
+          <p:cNvPr id="126" name="PlaceHolder 1"/>
           <p:cNvSpPr>
             <a:spLocks noGrp="1"/>
           </p:cNvSpPr>
@@ -744,7 +844,7 @@
               <a:rPr lang="en-US" sz="2000">
                 <a:latin typeface="Arial"/>
               </a:rPr>
-              <a:t>Jesteśmy bardzo ciekawi z czego jesteście najbardziej dumni i co przyniosło Wam najwięcej satysfakcji – w tym miejscu możecie się tym podzielić </a:t>
+              <a:t>Teraz pora na najważniejsze, czyli zaprezentowanie jak działa wasza aplikacja </a:t>
             </a:r>
             <a:r>
               <a:rPr lang="en-US" sz="2000">
@@ -758,7 +858,7 @@
       </p:sp>
       <p:sp>
         <p:nvSpPr>
-          <p:cNvPr id="123" name="CustomShape 2"/>
+          <p:cNvPr id="127" name="CustomShape 2"/>
           <p:cNvSpPr/>
           <p:nvPr/>
         </p:nvSpPr>
@@ -783,108 +883,7 @@
                 <a:spcPct val="100000"/>
               </a:lnSpc>
             </a:pPr>
-            <a:fld id="{8CB5C186-17F4-4DD8-91C8-CFD0616AEEE6}" type="slidenum">
-              <a:rPr lang="en-US" sz="1200">
-                <a:solidFill>
-                  <a:srgbClr val="000000"/>
-                </a:solidFill>
-                <a:latin typeface="+mn-lt"/>
-                <a:ea typeface="+mn-ea"/>
-              </a:rPr>
-              <a:t>&lt;number&gt;</a:t>
-            </a:fld>
-            <a:endParaRPr/>
-          </a:p>
-        </p:txBody>
-      </p:sp>
-    </p:spTree>
-  </p:cSld>
-</p:notes>
-</file>
-
-<file path=ppt/notesSlides/notesSlide8.xml><?xml version="1.0" encoding="utf-8"?>
-<p:notes xmlns:a="http://schemas.openxmlformats.org/drawingml/2006/main" xmlns:p="http://schemas.openxmlformats.org/presentationml/2006/main" xmlns:r="http://schemas.openxmlformats.org/officeDocument/2006/relationships">
-  <p:cSld>
-    <p:spTree>
-      <p:nvGrpSpPr>
-        <p:cNvPr id="1" name=""/>
-        <p:cNvGrpSpPr/>
-        <p:nvPr/>
-      </p:nvGrpSpPr>
-      <p:grpSpPr>
-        <a:xfrm>
-          <a:off x="0" y="0"/>
-          <a:ext cx="0" cy="0"/>
-          <a:chOff x="0" y="0"/>
-          <a:chExt cx="0" cy="0"/>
-        </a:xfrm>
-      </p:grpSpPr>
-      <p:sp>
-        <p:nvSpPr>
-          <p:cNvPr id="124" name="PlaceHolder 1"/>
-          <p:cNvSpPr>
-            <a:spLocks noGrp="1"/>
-          </p:cNvSpPr>
-          <p:nvPr>
-            <p:ph type="body"/>
-          </p:nvPr>
-        </p:nvSpPr>
-        <p:spPr>
-          <a:xfrm>
-            <a:off x="685800" y="4400640"/>
-            <a:ext cx="5485680" cy="3599640"/>
-          </a:xfrm>
-          <a:prstGeom prst="rect">
-            <a:avLst/>
-          </a:prstGeom>
-        </p:spPr>
-        <p:txBody>
-          <a:bodyPr lIns="0" rIns="0" tIns="0" bIns="0"/>
-          <a:p>
-            <a:r>
-              <a:rPr lang="en-US" sz="2000">
-                <a:latin typeface="Arial"/>
-              </a:rPr>
-              <a:t>Teraz pora na najważniejsze, czyli zaprezentowanie jak działa wasza aplikacja </a:t>
-            </a:r>
-            <a:r>
-              <a:rPr lang="en-US" sz="2000">
-                <a:latin typeface="Wingdings"/>
-              </a:rPr>
-              <a:t> </a:t>
-            </a:r>
-            <a:endParaRPr/>
-          </a:p>
-        </p:txBody>
-      </p:sp>
-      <p:sp>
-        <p:nvSpPr>
-          <p:cNvPr id="125" name="CustomShape 2"/>
-          <p:cNvSpPr/>
-          <p:nvPr/>
-        </p:nvSpPr>
-        <p:spPr>
-          <a:xfrm>
-            <a:off x="3884760" y="8685360"/>
-            <a:ext cx="2971080" cy="457920"/>
-          </a:xfrm>
-          <a:prstGeom prst="rect">
-            <a:avLst/>
-          </a:prstGeom>
-          <a:noFill/>
-          <a:ln>
-            <a:noFill/>
-          </a:ln>
-        </p:spPr>
-        <p:txBody>
-          <a:bodyPr lIns="90000" rIns="90000" tIns="45000" bIns="45000" anchor="b"/>
-          <a:p>
-            <a:pPr algn="r">
-              <a:lnSpc>
-                <a:spcPct val="100000"/>
-              </a:lnSpc>
-            </a:pPr>
-            <a:fld id="{27132DD8-CFAD-48E4-926D-BE769D48684D}" type="slidenum">
+            <a:fld id="{010C9E72-8466-45EF-A0D5-660A3AA1D8BC}" type="slidenum">
               <a:rPr lang="en-US" sz="1200">
                 <a:solidFill>
                   <a:srgbClr val="000000"/>
@@ -3557,7 +3556,7 @@
                 <a:spcPct val="100000"/>
               </a:lnSpc>
             </a:pPr>
-            <a:fld id="{1A3C4CD9-1368-446A-AA5B-52F756A81C34}" type="slidenum">
+            <a:fld id="{CECA0267-02AA-44F2-9358-7AEC605872DD}" type="slidenum">
               <a:rPr lang="en-US" sz="700">
                 <a:solidFill>
                   <a:srgbClr val="808080"/>
@@ -3984,7 +3983,7 @@
                 </a:solidFill>
                 <a:latin typeface="Calibri Light"/>
               </a:rPr>
-              <a:t>WASZA DRUŻYNA </a:t>
+              <a:t>NASZA DRUŻYNA </a:t>
             </a:r>
             <a:endParaRPr/>
           </a:p>
@@ -4525,7 +4524,7 @@
                 </a:solidFill>
                 <a:latin typeface="Calibri Light"/>
               </a:rPr>
-              <a:t>WASZA APLIKACJA </a:t>
+              <a:t>NASZA APLIKACJA </a:t>
             </a:r>
             <a:endParaRPr/>
           </a:p>
@@ -4670,6 +4669,145 @@
           </a:ln>
         </p:spPr>
       </p:pic>
+      <p:sp>
+        <p:nvSpPr>
+          <p:cNvPr id="99" name="TextShape 2"/>
+          <p:cNvSpPr txBox="1"/>
+          <p:nvPr/>
+        </p:nvSpPr>
+        <p:spPr>
+          <a:xfrm>
+            <a:off x="524880" y="1188720"/>
+            <a:ext cx="3589920" cy="2743200"/>
+          </a:xfrm>
+          <a:prstGeom prst="rect">
+            <a:avLst/>
+          </a:prstGeom>
+        </p:spPr>
+        <p:txBody>
+          <a:bodyPr lIns="90000" rIns="90000" tIns="45000" bIns="45000"/>
+          <a:p>
+            <a:pPr algn="ctr">
+              <a:lnSpc>
+                <a:spcPct val="100000"/>
+              </a:lnSpc>
+            </a:pPr>
+            <a:r>
+              <a:rPr b="1" lang="en-US" sz="1600">
+                <a:solidFill>
+                  <a:srgbClr val="404040"/>
+                </a:solidFill>
+                <a:latin typeface="Calibri"/>
+              </a:rPr>
+              <a:t>Interfejs w CSS, HTML</a:t>
+            </a:r>
+            <a:endParaRPr/>
+          </a:p>
+          <a:p>
+            <a:pPr algn="ctr">
+              <a:lnSpc>
+                <a:spcPct val="100000"/>
+              </a:lnSpc>
+            </a:pPr>
+            <a:endParaRPr/>
+          </a:p>
+          <a:p>
+            <a:pPr algn="ctr">
+              <a:lnSpc>
+                <a:spcPct val="100000"/>
+              </a:lnSpc>
+            </a:pPr>
+            <a:endParaRPr/>
+          </a:p>
+          <a:p>
+            <a:pPr algn="ctr">
+              <a:lnSpc>
+                <a:spcPct val="100000"/>
+              </a:lnSpc>
+            </a:pPr>
+            <a:r>
+              <a:rPr b="1" lang="en-US" sz="1600">
+                <a:solidFill>
+                  <a:srgbClr val="404040"/>
+                </a:solidFill>
+                <a:latin typeface="Calibri"/>
+              </a:rPr>
+              <a:t>Serwer IoT:</a:t>
+            </a:r>
+            <a:endParaRPr/>
+          </a:p>
+          <a:p>
+            <a:pPr algn="ctr">
+              <a:lnSpc>
+                <a:spcPct val="100000"/>
+              </a:lnSpc>
+            </a:pPr>
+            <a:r>
+              <a:rPr b="1" lang="en-US" sz="1600">
+                <a:solidFill>
+                  <a:srgbClr val="404040"/>
+                </a:solidFill>
+                <a:latin typeface="Calibri"/>
+              </a:rPr>
+              <a:t>PHP (Symfony), HTTP, TCP/IP</a:t>
+            </a:r>
+            <a:endParaRPr/>
+          </a:p>
+        </p:txBody>
+      </p:sp>
+      <p:sp>
+        <p:nvSpPr>
+          <p:cNvPr id="100" name="TextShape 3"/>
+          <p:cNvSpPr txBox="1"/>
+          <p:nvPr/>
+        </p:nvSpPr>
+        <p:spPr>
+          <a:xfrm>
+            <a:off x="5029200" y="1190160"/>
+            <a:ext cx="3474720" cy="2467440"/>
+          </a:xfrm>
+          <a:prstGeom prst="rect">
+            <a:avLst/>
+          </a:prstGeom>
+        </p:spPr>
+        <p:txBody>
+          <a:bodyPr lIns="90000" rIns="90000" tIns="45000" bIns="45000"/>
+          <a:p>
+            <a:pPr algn="ctr">
+              <a:lnSpc>
+                <a:spcPct val="100000"/>
+              </a:lnSpc>
+            </a:pPr>
+            <a:r>
+              <a:rPr b="1" lang="en-US" sz="1600">
+                <a:solidFill>
+                  <a:srgbClr val="404040"/>
+                </a:solidFill>
+                <a:latin typeface="Calibri"/>
+              </a:rPr>
+              <a:t>Oprogramowanie I komunikacja czujników:</a:t>
+            </a:r>
+            <a:endParaRPr/>
+          </a:p>
+          <a:p>
+            <a:pPr algn="ctr">
+              <a:lnSpc>
+                <a:spcPct val="100000"/>
+              </a:lnSpc>
+            </a:pPr>
+            <a:r>
+              <a:rPr b="1" lang="en-US" sz="1600">
+                <a:solidFill>
+                  <a:srgbClr val="404040"/>
+                </a:solidFill>
+                <a:latin typeface="Calibri"/>
+              </a:rPr>
+              <a:t>C, C++, Arduino, WLAN 2,4GHz, HTTP</a:t>
+            </a:r>
+            <a:endParaRPr/>
+          </a:p>
+        </p:txBody>
+      </p:sp>
     </p:spTree>
   </p:cSld>
   <p:timing>
@@ -4721,7 +4859,7 @@
       </p:grpSpPr>
       <p:sp>
         <p:nvSpPr>
-          <p:cNvPr id="99" name="CustomShape 1"/>
+          <p:cNvPr id="101" name="CustomShape 1"/>
           <p:cNvSpPr/>
           <p:nvPr/>
         </p:nvSpPr>
@@ -4753,7 +4891,7 @@
                 </a:solidFill>
                 <a:latin typeface="Calibri Light"/>
               </a:rPr>
-              <a:t>Wykorzystane api </a:t>
+              <a:t>Napotkane problemy</a:t>
             </a:r>
             <a:endParaRPr/>
           </a:p>
@@ -4761,7 +4899,7 @@
       </p:sp>
       <p:pic>
         <p:nvPicPr>
-          <p:cNvPr id="100" name="Picture 2" descr=""/>
+          <p:cNvPr id="102" name="Picture 6" descr=""/>
           <p:cNvPicPr/>
           <p:nvPr/>
         </p:nvPicPr>
@@ -4772,18 +4910,137 @@
           </a:stretch>
         </p:blipFill>
         <p:spPr>
-          <a:xfrm>
-            <a:off x="5518080" y="4114800"/>
-            <a:ext cx="3371040" cy="2247120"/>
-          </a:xfrm>
-          <a:prstGeom prst="rect">
-            <a:avLst/>
-          </a:prstGeom>
-          <a:ln>
-            <a:noFill/>
+          <a:xfrm rot="20567400">
+            <a:off x="6118200" y="1457280"/>
+            <a:ext cx="2562120" cy="2133000"/>
+          </a:xfrm>
+          <a:prstGeom prst="rect">
+            <a:avLst/>
+          </a:prstGeom>
+          <a:ln w="88920">
+            <a:solidFill>
+              <a:srgbClr val="ffffff"/>
+            </a:solidFill>
+            <a:miter/>
           </a:ln>
         </p:spPr>
       </p:pic>
+      <p:pic>
+        <p:nvPicPr>
+          <p:cNvPr id="103" name="Picture 8" descr=""/>
+          <p:cNvPicPr/>
+          <p:nvPr/>
+        </p:nvPicPr>
+        <p:blipFill>
+          <a:blip r:embed="rId2"/>
+          <a:stretch>
+            <a:fillRect/>
+          </a:stretch>
+        </p:blipFill>
+        <p:spPr>
+          <a:xfrm rot="670800">
+            <a:off x="5231160" y="3525840"/>
+            <a:ext cx="3569400" cy="2640240"/>
+          </a:xfrm>
+          <a:prstGeom prst="rect">
+            <a:avLst/>
+          </a:prstGeom>
+          <a:ln w="88920">
+            <a:solidFill>
+              <a:srgbClr val="ffffff"/>
+            </a:solidFill>
+            <a:miter/>
+          </a:ln>
+        </p:spPr>
+      </p:pic>
+      <p:sp>
+        <p:nvSpPr>
+          <p:cNvPr id="104" name="TextShape 2"/>
+          <p:cNvSpPr txBox="1"/>
+          <p:nvPr/>
+        </p:nvSpPr>
+        <p:spPr>
+          <a:xfrm>
+            <a:off x="548640" y="1332360"/>
+            <a:ext cx="4092480" cy="4574160"/>
+          </a:xfrm>
+          <a:prstGeom prst="rect">
+            <a:avLst/>
+          </a:prstGeom>
+        </p:spPr>
+        <p:txBody>
+          <a:bodyPr lIns="90000" rIns="90000" tIns="45000" bIns="45000"/>
+          <a:p>
+            <a:r>
+              <a:rPr b="1" lang="en-US" sz="1600">
+                <a:latin typeface="Arial"/>
+              </a:rPr>
+              <a:t>Standardowe problemy sprzętowe:</a:t>
+            </a:r>
+            <a:endParaRPr/>
+          </a:p>
+          <a:p>
+            <a:r>
+              <a:rPr lang="en-US" sz="1600">
+                <a:latin typeface="Arial"/>
+              </a:rPr>
+              <a:t>- brak lutownicy</a:t>
+            </a:r>
+            <a:endParaRPr/>
+          </a:p>
+          <a:p>
+            <a:r>
+              <a:rPr lang="en-US" sz="1600">
+                <a:latin typeface="Arial"/>
+              </a:rPr>
+              <a:t>- gorący klej zbyt chłodny</a:t>
+            </a:r>
+            <a:endParaRPr/>
+          </a:p>
+          <a:p>
+            <a:r>
+              <a:rPr lang="en-US" sz="1600">
+                <a:latin typeface="Arial"/>
+              </a:rPr>
+              <a:t>- zbyt dużo kabli</a:t>
+            </a:r>
+            <a:endParaRPr/>
+          </a:p>
+          <a:p>
+            <a:endParaRPr/>
+          </a:p>
+          <a:p>
+            <a:endParaRPr/>
+          </a:p>
+          <a:p>
+            <a:r>
+              <a:rPr b="1" lang="en-US" sz="1600">
+                <a:latin typeface="Arial"/>
+              </a:rPr>
+              <a:t>Problemy komunikacyjne:</a:t>
+            </a:r>
+            <a:endParaRPr/>
+          </a:p>
+          <a:p>
+            <a:r>
+              <a:rPr lang="en-US" sz="1600">
+                <a:latin typeface="Arial"/>
+              </a:rPr>
+              <a:t>- mniej więcej 6 godzin przed końcem członkowie zespołu wykrzykiwali do siebie tylko liczby i niezrozumiałe nazwy</a:t>
+            </a:r>
+            <a:endParaRPr/>
+          </a:p>
+          <a:p>
+            <a:endParaRPr/>
+          </a:p>
+          <a:p>
+            <a:endParaRPr/>
+          </a:p>
+          <a:p>
+            <a:endParaRPr/>
+          </a:p>
+        </p:txBody>
+      </p:sp>
     </p:spTree>
   </p:cSld>
   <p:timing>
@@ -4835,7 +5092,7 @@
       </p:grpSpPr>
       <p:sp>
         <p:nvSpPr>
-          <p:cNvPr id="101" name="CustomShape 1"/>
+          <p:cNvPr id="105" name="CustomShape 1"/>
           <p:cNvSpPr/>
           <p:nvPr/>
         </p:nvSpPr>
@@ -4867,7 +5124,7 @@
                 </a:solidFill>
                 <a:latin typeface="Calibri Light"/>
               </a:rPr>
-              <a:t>Napotkane problemy</a:t>
+              <a:t>Czym możecie się pochwalić? </a:t>
             </a:r>
             <a:endParaRPr/>
           </a:p>
@@ -4875,7 +5132,7 @@
       </p:sp>
       <p:pic>
         <p:nvPicPr>
-          <p:cNvPr id="102" name="Picture 6" descr=""/>
+          <p:cNvPr id="106" name="Picture 6" descr=""/>
           <p:cNvPicPr/>
           <p:nvPr/>
         </p:nvPicPr>
@@ -4886,9 +5143,9 @@
           </a:stretch>
         </p:blipFill>
         <p:spPr>
-          <a:xfrm rot="20567400">
-            <a:off x="6118200" y="1457280"/>
-            <a:ext cx="2562120" cy="2133000"/>
+          <a:xfrm rot="577200">
+            <a:off x="239760" y="3164400"/>
+            <a:ext cx="3130920" cy="1699920"/>
           </a:xfrm>
           <a:prstGeom prst="rect">
             <a:avLst/>
@@ -4903,7 +5160,7 @@
       </p:pic>
       <p:pic>
         <p:nvPicPr>
-          <p:cNvPr id="103" name="Picture 8" descr=""/>
+          <p:cNvPr id="107" name="Picture 2" descr=""/>
           <p:cNvPicPr/>
           <p:nvPr/>
         </p:nvPicPr>
@@ -4914,9 +5171,9 @@
           </a:stretch>
         </p:blipFill>
         <p:spPr>
-          <a:xfrm rot="670800">
-            <a:off x="5231160" y="3525840"/>
-            <a:ext cx="3569400" cy="2640240"/>
+          <a:xfrm rot="21131400">
+            <a:off x="358200" y="1419120"/>
+            <a:ext cx="2939400" cy="1626480"/>
           </a:xfrm>
           <a:prstGeom prst="rect">
             <a:avLst/>
@@ -4929,16 +5186,44 @@
           </a:ln>
         </p:spPr>
       </p:pic>
-      <p:sp>
-        <p:nvSpPr>
-          <p:cNvPr id="104" name="TextShape 2"/>
+      <p:pic>
+        <p:nvPicPr>
+          <p:cNvPr id="108" name="Picture 4" descr=""/>
+          <p:cNvPicPr/>
+          <p:nvPr/>
+        </p:nvPicPr>
+        <p:blipFill>
+          <a:blip r:embed="rId3"/>
+          <a:stretch>
+            <a:fillRect/>
+          </a:stretch>
+        </p:blipFill>
+        <p:spPr>
+          <a:xfrm rot="20961000">
+            <a:off x="211680" y="4923720"/>
+            <a:ext cx="2905560" cy="1270800"/>
+          </a:xfrm>
+          <a:prstGeom prst="rect">
+            <a:avLst/>
+          </a:prstGeom>
+          <a:ln w="88920">
+            <a:solidFill>
+              <a:srgbClr val="ffffff"/>
+            </a:solidFill>
+            <a:miter/>
+          </a:ln>
+        </p:spPr>
+      </p:pic>
+      <p:sp>
+        <p:nvSpPr>
+          <p:cNvPr id="109" name="TextShape 2"/>
           <p:cNvSpPr txBox="1"/>
           <p:nvPr/>
         </p:nvSpPr>
         <p:spPr>
           <a:xfrm>
-            <a:off x="548640" y="1332360"/>
-            <a:ext cx="4092480" cy="2325240"/>
+            <a:off x="3657600" y="1188720"/>
+            <a:ext cx="5497920" cy="4572360"/>
           </a:xfrm>
           <a:prstGeom prst="rect">
             <a:avLst/>
@@ -4947,11 +5232,150 @@
         <p:txBody>
           <a:bodyPr lIns="90000" rIns="90000" tIns="45000" bIns="45000"/>
           <a:p>
-            <a:r>
-              <a:rPr lang="en-US" sz="1000">
-                <a:latin typeface="Arial"/>
-              </a:rPr>
-              <a:t>Z niemal każdym elementem, którego w pośpiechu użyliśmy, żeby dostarczyć na czas dopracowane rozwiązanie. Transmisja WiFi 2,4 GHz</a:t>
+            <a:pPr>
+              <a:lnSpc>
+                <a:spcPct val="100000"/>
+              </a:lnSpc>
+            </a:pPr>
+            <a:r>
+              <a:rPr lang="en-US" sz="2000">
+                <a:solidFill>
+                  <a:srgbClr val="404040"/>
+                </a:solidFill>
+                <a:latin typeface="Calibri Light"/>
+              </a:rPr>
+              <a:t>Wartości w naszej aplikacji</a:t>
+            </a:r>
+            <a:endParaRPr/>
+          </a:p>
+          <a:p>
+            <a:pPr>
+              <a:lnSpc>
+                <a:spcPct val="100000"/>
+              </a:lnSpc>
+            </a:pPr>
+            <a:endParaRPr/>
+          </a:p>
+          <a:p>
+            <a:pPr>
+              <a:lnSpc>
+                <a:spcPct val="100000"/>
+              </a:lnSpc>
+            </a:pPr>
+            <a:r>
+              <a:rPr lang="en-US" sz="2000">
+                <a:solidFill>
+                  <a:srgbClr val="404040"/>
+                </a:solidFill>
+                <a:latin typeface="Calibri Light"/>
+              </a:rPr>
+              <a:t>- </a:t>
+            </a:r>
+            <a:r>
+              <a:rPr b="1" lang="en-US" sz="2000">
+                <a:solidFill>
+                  <a:srgbClr val="404040"/>
+                </a:solidFill>
+                <a:latin typeface="Calibri Light"/>
+              </a:rPr>
+              <a:t>elastyczność:</a:t>
+            </a:r>
+            <a:r>
+              <a:rPr lang="en-US" sz="2000">
+                <a:solidFill>
+                  <a:srgbClr val="404040"/>
+                </a:solidFill>
+                <a:latin typeface="Calibri Light"/>
+              </a:rPr>
+              <a:t> domowy system </a:t>
+            </a:r>
+            <a:r>
+              <a:rPr b="1" lang="en-US" sz="2000">
+                <a:solidFill>
+                  <a:srgbClr val="404040"/>
+                </a:solidFill>
+                <a:latin typeface="Calibri Light"/>
+              </a:rPr>
+              <a:t>IoT</a:t>
+            </a:r>
+            <a:r>
+              <a:rPr lang="en-US" sz="2000">
+                <a:solidFill>
+                  <a:srgbClr val="404040"/>
+                </a:solidFill>
+                <a:latin typeface="Calibri Light"/>
+              </a:rPr>
+              <a:t> naturalnie dostosowuje się do potrzeb użytkownika prywatnego lub biznesowego </a:t>
+            </a:r>
+            <a:endParaRPr/>
+          </a:p>
+          <a:p>
+            <a:pPr>
+              <a:lnSpc>
+                <a:spcPct val="100000"/>
+              </a:lnSpc>
+            </a:pPr>
+            <a:r>
+              <a:rPr lang="en-US" sz="2000">
+                <a:solidFill>
+                  <a:srgbClr val="404040"/>
+                </a:solidFill>
+                <a:latin typeface="Calibri Light"/>
+              </a:rPr>
+              <a:t>- </a:t>
+            </a:r>
+            <a:r>
+              <a:rPr b="1" lang="en-US" sz="2000">
+                <a:solidFill>
+                  <a:srgbClr val="404040"/>
+                </a:solidFill>
+                <a:latin typeface="Calibri Light"/>
+              </a:rPr>
+              <a:t>przejrzystość:</a:t>
+            </a:r>
+            <a:r>
+              <a:rPr lang="en-US" sz="2000">
+                <a:solidFill>
+                  <a:srgbClr val="404040"/>
+                </a:solidFill>
+                <a:latin typeface="Calibri Light"/>
+              </a:rPr>
+              <a:t> w każdej chwili masz dostęp do wszystkich informacji na temat swojego domu. Możesz udostępnić niektóre z nich policji lub sąsiadowi na czas wyjazdu.</a:t>
+            </a:r>
+            <a:endParaRPr/>
+          </a:p>
+          <a:p>
+            <a:pPr>
+              <a:lnSpc>
+                <a:spcPct val="100000"/>
+              </a:lnSpc>
+            </a:pPr>
+            <a:r>
+              <a:rPr lang="en-US" sz="2000">
+                <a:solidFill>
+                  <a:srgbClr val="404040"/>
+                </a:solidFill>
+                <a:latin typeface="Calibri Light"/>
+              </a:rPr>
+              <a:t>- </a:t>
+            </a:r>
+            <a:r>
+              <a:rPr b="1" lang="en-US" sz="2000">
+                <a:solidFill>
+                  <a:srgbClr val="404040"/>
+                </a:solidFill>
+                <a:latin typeface="Calibri Light"/>
+              </a:rPr>
+              <a:t>jakość:</a:t>
+            </a:r>
+            <a:r>
+              <a:rPr lang="en-US" sz="2000">
+                <a:solidFill>
+                  <a:srgbClr val="404040"/>
+                </a:solidFill>
+                <a:latin typeface="Calibri Light"/>
+              </a:rPr>
+              <a:t> dzięki automatycznym reakcjom na problemy w Twoim otoczeniu gHost zapewnia komfort i najwyższą jakość życia</a:t>
             </a:r>
             <a:endParaRPr/>
           </a:p>
@@ -5008,7 +5432,7 @@
       </p:grpSpPr>
       <p:sp>
         <p:nvSpPr>
-          <p:cNvPr id="105" name="CustomShape 1"/>
+          <p:cNvPr id="110" name="CustomShape 1"/>
           <p:cNvSpPr/>
           <p:nvPr/>
         </p:nvSpPr>
@@ -5040,128 +5464,16 @@
                 </a:solidFill>
                 <a:latin typeface="Calibri Light"/>
               </a:rPr>
-              <a:t>Czym możecie się pochwalić? </a:t>
-            </a:r>
-            <a:endParaRPr/>
-          </a:p>
-        </p:txBody>
-      </p:sp>
-      <p:pic>
-        <p:nvPicPr>
-          <p:cNvPr id="106" name="Picture 6" descr=""/>
-          <p:cNvPicPr/>
-          <p:nvPr/>
-        </p:nvPicPr>
-        <p:blipFill>
-          <a:blip r:embed="rId1"/>
-          <a:stretch>
-            <a:fillRect/>
-          </a:stretch>
-        </p:blipFill>
-        <p:spPr>
-          <a:xfrm rot="577200">
-            <a:off x="239760" y="3164400"/>
-            <a:ext cx="3130920" cy="1699920"/>
-          </a:xfrm>
-          <a:prstGeom prst="rect">
-            <a:avLst/>
-          </a:prstGeom>
-          <a:ln w="88920">
-            <a:solidFill>
-              <a:srgbClr val="ffffff"/>
-            </a:solidFill>
-            <a:miter/>
-          </a:ln>
-        </p:spPr>
-      </p:pic>
-      <p:pic>
-        <p:nvPicPr>
-          <p:cNvPr id="107" name="Picture 2" descr=""/>
-          <p:cNvPicPr/>
-          <p:nvPr/>
-        </p:nvPicPr>
-        <p:blipFill>
-          <a:blip r:embed="rId2"/>
-          <a:stretch>
-            <a:fillRect/>
-          </a:stretch>
-        </p:blipFill>
-        <p:spPr>
-          <a:xfrm rot="21131400">
-            <a:off x="358200" y="1419120"/>
-            <a:ext cx="2939400" cy="1626480"/>
-          </a:xfrm>
-          <a:prstGeom prst="rect">
-            <a:avLst/>
-          </a:prstGeom>
-          <a:ln w="88920">
-            <a:solidFill>
-              <a:srgbClr val="ffffff"/>
-            </a:solidFill>
-            <a:miter/>
-          </a:ln>
-        </p:spPr>
-      </p:pic>
-      <p:pic>
-        <p:nvPicPr>
-          <p:cNvPr id="108" name="Picture 4" descr=""/>
-          <p:cNvPicPr/>
-          <p:nvPr/>
-        </p:nvPicPr>
-        <p:blipFill>
-          <a:blip r:embed="rId3"/>
-          <a:stretch>
-            <a:fillRect/>
-          </a:stretch>
-        </p:blipFill>
-        <p:spPr>
-          <a:xfrm rot="20961000">
-            <a:off x="211680" y="4923720"/>
-            <a:ext cx="2905560" cy="1270800"/>
-          </a:xfrm>
-          <a:prstGeom prst="rect">
-            <a:avLst/>
-          </a:prstGeom>
-          <a:ln w="88920">
-            <a:solidFill>
-              <a:srgbClr val="ffffff"/>
-            </a:solidFill>
-            <a:miter/>
-          </a:ln>
-        </p:spPr>
-      </p:pic>
-      <p:sp>
-        <p:nvSpPr>
-          <p:cNvPr id="109" name="TextShape 2"/>
-          <p:cNvSpPr txBox="1"/>
-          <p:nvPr/>
-        </p:nvSpPr>
-        <p:spPr>
-          <a:xfrm>
-            <a:off x="3657600" y="1188720"/>
-            <a:ext cx="5497920" cy="4871160"/>
-          </a:xfrm>
-          <a:prstGeom prst="rect">
-            <a:avLst/>
-          </a:prstGeom>
-        </p:spPr>
-        <p:txBody>
-          <a:bodyPr lIns="90000" rIns="90000" tIns="45000" bIns="45000"/>
+              <a:t>A oto jak działa nasza aplikacja… </a:t>
+            </a:r>
+            <a:endParaRPr/>
+          </a:p>
           <a:p>
             <a:pPr>
               <a:lnSpc>
                 <a:spcPct val="100000"/>
               </a:lnSpc>
             </a:pPr>
-            <a:r>
-              <a:rPr lang="en-US" sz="2000">
-                <a:solidFill>
-                  <a:srgbClr val="404040"/>
-                </a:solidFill>
-                <a:latin typeface="Calibri Light"/>
-              </a:rPr>
-              <a:t>Wartości w naszej aplikacji</a:t>
-            </a:r>
             <a:endParaRPr/>
           </a:p>
           <a:p>
@@ -5178,60 +5490,6 @@
                 <a:spcPct val="100000"/>
               </a:lnSpc>
             </a:pPr>
-            <a:r>
-              <a:rPr lang="en-US" sz="2000">
-                <a:solidFill>
-                  <a:srgbClr val="404040"/>
-                </a:solidFill>
-                <a:latin typeface="Calibri Light"/>
-              </a:rPr>
-              <a:t>- </a:t>
-            </a:r>
-            <a:r>
-              <a:rPr b="1" lang="en-US" sz="2000">
-                <a:solidFill>
-                  <a:srgbClr val="404040"/>
-                </a:solidFill>
-                <a:latin typeface="Calibri Light"/>
-              </a:rPr>
-              <a:t>elastyczność:</a:t>
-            </a:r>
-            <a:r>
-              <a:rPr lang="en-US" sz="2000">
-                <a:solidFill>
-                  <a:srgbClr val="404040"/>
-                </a:solidFill>
-                <a:latin typeface="Calibri Light"/>
-              </a:rPr>
-              <a:t> domowy system </a:t>
-            </a:r>
-            <a:r>
-              <a:rPr b="1" lang="en-US" sz="2000">
-                <a:solidFill>
-                  <a:srgbClr val="404040"/>
-                </a:solidFill>
-                <a:latin typeface="Calibri Light"/>
-              </a:rPr>
-              <a:t>IoT</a:t>
-            </a:r>
-            <a:r>
-              <a:rPr lang="en-US" sz="2000">
-                <a:solidFill>
-                  <a:srgbClr val="404040"/>
-                </a:solidFill>
-                <a:latin typeface="Calibri Light"/>
-              </a:rPr>
-              <a:t> naturalnie dostosowuje się do potrzeb użytkownika prywatnego lub biznesowego </a:t>
-            </a:r>
-            <a:r>
-              <a:rPr lang="en-US" sz="1000">
-                <a:solidFill>
-                  <a:srgbClr val="404040"/>
-                </a:solidFill>
-                <a:latin typeface="Calibri Light"/>
-              </a:rPr>
-              <a:t>(możesz zdecydować się na te czujniki, które uważasz za przydatne. W mobilnym panelu wybierasz potem reakcje na pochodzące od nich sygnały)</a:t>
-            </a:r>
             <a:endParaRPr/>
           </a:p>
           <a:p>
@@ -5240,175 +5498,6 @@
                 <a:spcPct val="100000"/>
               </a:lnSpc>
             </a:pPr>
-            <a:r>
-              <a:rPr lang="en-US" sz="2000">
-                <a:solidFill>
-                  <a:srgbClr val="404040"/>
-                </a:solidFill>
-                <a:latin typeface="Calibri Light"/>
-              </a:rPr>
-              <a:t>- </a:t>
-            </a:r>
-            <a:r>
-              <a:rPr b="1" lang="en-US" sz="2000">
-                <a:solidFill>
-                  <a:srgbClr val="404040"/>
-                </a:solidFill>
-                <a:latin typeface="Calibri Light"/>
-              </a:rPr>
-              <a:t>przejrzystość:</a:t>
-            </a:r>
-            <a:r>
-              <a:rPr lang="en-US" sz="2000">
-                <a:solidFill>
-                  <a:srgbClr val="404040"/>
-                </a:solidFill>
-                <a:latin typeface="Calibri Light"/>
-              </a:rPr>
-              <a:t> w każdej chwili masz dostęp do wszystkich informacji na temat swojego domu. Możesz udostępnić niektóre z nich policji lub sąsiadowi na czas wyjazdu.</a:t>
-            </a:r>
-            <a:endParaRPr/>
-          </a:p>
-          <a:p>
-            <a:pPr>
-              <a:lnSpc>
-                <a:spcPct val="100000"/>
-              </a:lnSpc>
-            </a:pPr>
-            <a:r>
-              <a:rPr lang="en-US" sz="2000">
-                <a:solidFill>
-                  <a:srgbClr val="404040"/>
-                </a:solidFill>
-                <a:latin typeface="Calibri Light"/>
-              </a:rPr>
-              <a:t>- </a:t>
-            </a:r>
-            <a:r>
-              <a:rPr b="1" lang="en-US" sz="2000">
-                <a:solidFill>
-                  <a:srgbClr val="404040"/>
-                </a:solidFill>
-                <a:latin typeface="Calibri Light"/>
-              </a:rPr>
-              <a:t>jakość:</a:t>
-            </a:r>
-            <a:r>
-              <a:rPr lang="en-US" sz="2000">
-                <a:solidFill>
-                  <a:srgbClr val="404040"/>
-                </a:solidFill>
-                <a:latin typeface="Calibri Light"/>
-              </a:rPr>
-              <a:t> dzięki automatycznym reakcjom na problemy w Twoim otoczeniu gHost zapewnia komfort i najwyższą jakość życia</a:t>
-            </a:r>
-            <a:endParaRPr/>
-          </a:p>
-        </p:txBody>
-      </p:sp>
-    </p:spTree>
-  </p:cSld>
-  <p:timing>
-    <p:tnLst>
-      <p:par>
-        <p:cTn id="13" dur="indefinite" restart="never" nodeType="tmRoot">
-          <p:childTnLst>
-            <p:seq>
-              <p:cTn id="14" nodeType="mainSeq"/>
-              <p:prevCondLst>
-                <p:cond delay="0" evt="onPrev">
-                  <p:tgtEl>
-                    <p:sldTgt/>
-                  </p:tgtEl>
-                </p:cond>
-              </p:prevCondLst>
-              <p:nextCondLst>
-                <p:cond delay="0" evt="onNext">
-                  <p:tgtEl>
-                    <p:sldTgt/>
-                  </p:tgtEl>
-                </p:cond>
-              </p:nextCondLst>
-            </p:seq>
-          </p:childTnLst>
-        </p:cTn>
-      </p:par>
-    </p:tnLst>
-  </p:timing>
-</p:sld>
-</file>
-
-<file path=ppt/slides/slide8.xml><?xml version="1.0" encoding="utf-8"?>
-<p:sld xmlns:a="http://schemas.openxmlformats.org/drawingml/2006/main" xmlns:p="http://schemas.openxmlformats.org/presentationml/2006/main" xmlns:r="http://schemas.openxmlformats.org/officeDocument/2006/relationships">
-  <p:cSld>
-    <p:spTree>
-      <p:nvGrpSpPr>
-        <p:cNvPr id="1" name=""/>
-        <p:cNvGrpSpPr/>
-        <p:nvPr/>
-      </p:nvGrpSpPr>
-      <p:grpSpPr>
-        <a:xfrm>
-          <a:off x="0" y="0"/>
-          <a:ext cx="0" cy="0"/>
-          <a:chOff x="0" y="0"/>
-          <a:chExt cx="0" cy="0"/>
-        </a:xfrm>
-      </p:grpSpPr>
-      <p:sp>
-        <p:nvSpPr>
-          <p:cNvPr id="110" name="CustomShape 1"/>
-          <p:cNvSpPr/>
-          <p:nvPr/>
-        </p:nvSpPr>
-        <p:spPr>
-          <a:xfrm>
-            <a:off x="588960" y="129240"/>
-            <a:ext cx="7449120" cy="631080"/>
-          </a:xfrm>
-          <a:prstGeom prst="rect">
-            <a:avLst/>
-          </a:prstGeom>
-          <a:noFill/>
-          <a:ln>
-            <a:noFill/>
-          </a:ln>
-        </p:spPr>
-        <p:txBody>
-          <a:bodyPr lIns="90000" rIns="90000" tIns="45000" bIns="45000"/>
-          <a:p>
-            <a:pPr>
-              <a:lnSpc>
-                <a:spcPct val="100000"/>
-              </a:lnSpc>
-            </a:pPr>
-            <a:r>
-              <a:rPr b="1" lang="en-US" sz="2500">
-                <a:solidFill>
-                  <a:srgbClr val="404040"/>
-                </a:solidFill>
-                <a:latin typeface="Calibri Light"/>
-              </a:rPr>
-              <a:t>A oto jak działa nasza aplikacja… </a:t>
-            </a:r>
-            <a:r>
-              <a:rPr b="1" lang="en-US" sz="2500">
-                <a:solidFill>
-                  <a:srgbClr val="404040"/>
-                </a:solidFill>
-                <a:latin typeface="Wingdings"/>
-              </a:rPr>
-              <a:t></a:t>
-            </a:r>
-            <a:r>
-              <a:rPr b="1" lang="en-US" sz="2500">
-                <a:solidFill>
-                  <a:srgbClr val="404040"/>
-                </a:solidFill>
-                <a:latin typeface="Calibri Light"/>
-              </a:rPr>
-              <a:t> </a:t>
-            </a:r>
             <a:endParaRPr/>
           </a:p>
         </p:txBody>
@@ -5439,15 +5528,76 @@
           </a:ln>
         </p:spPr>
       </p:pic>
+      <p:pic>
+        <p:nvPicPr>
+          <p:cNvPr id="112" name="" descr=""/>
+          <p:cNvPicPr/>
+          <p:nvPr/>
+        </p:nvPicPr>
+        <p:blipFill>
+          <a:blip r:embed="rId2"/>
+          <a:stretch>
+            <a:fillRect/>
+          </a:stretch>
+        </p:blipFill>
+        <p:spPr>
+          <a:xfrm>
+            <a:off x="91440" y="1573920"/>
+            <a:ext cx="8961480" cy="4918320"/>
+          </a:xfrm>
+          <a:prstGeom prst="rect">
+            <a:avLst/>
+          </a:prstGeom>
+          <a:ln>
+            <a:noFill/>
+          </a:ln>
+        </p:spPr>
+      </p:pic>
+      <p:sp>
+        <p:nvSpPr>
+          <p:cNvPr id="113" name="TextShape 2"/>
+          <p:cNvSpPr txBox="1"/>
+          <p:nvPr/>
+        </p:nvSpPr>
+        <p:spPr>
+          <a:xfrm>
+            <a:off x="2651760" y="914400"/>
+            <a:ext cx="2651760" cy="462600"/>
+          </a:xfrm>
+          <a:prstGeom prst="rect">
+            <a:avLst/>
+          </a:prstGeom>
+        </p:spPr>
+        <p:txBody>
+          <a:bodyPr lIns="90000" rIns="90000" tIns="45000" bIns="45000"/>
+          <a:p>
+            <a:pPr>
+              <a:lnSpc>
+                <a:spcPct val="100000"/>
+              </a:lnSpc>
+            </a:pPr>
+            <a:r>
+              <a:rPr b="1" lang="en-US" sz="2500">
+                <a:solidFill>
+                  <a:srgbClr val="404040"/>
+                </a:solidFill>
+                <a:latin typeface="Calibri Light"/>
+              </a:rPr>
+              <a:t>[aplauz]</a:t>
+            </a:r>
+            <a:endParaRPr/>
+          </a:p>
+        </p:txBody>
+      </p:sp>
     </p:spTree>
   </p:cSld>
   <p:timing>
     <p:tnLst>
       <p:par>
-        <p:cTn id="15" dur="indefinite" restart="never" nodeType="tmRoot">
+        <p:cTn id="13" dur="indefinite" restart="never" nodeType="tmRoot">
           <p:childTnLst>
             <p:seq>
-              <p:cTn id="16" nodeType="mainSeq"/>
+              <p:cTn id="14" nodeType="mainSeq"/>
               <p:prevCondLst>
                 <p:cond delay="0" evt="onPrev">
                   <p:tgtEl>

</xml_diff>